<commit_message>
Added extra computer skills
</commit_message>
<xml_diff>
--- a/docs/ppt/GEOG0113-008.pptx
+++ b/docs/ppt/GEOG0113-008.pptx
@@ -9812,44 +9812,6 @@
           </a:p>
         </p:txBody>
       </p:sp>
-      <p:pic>
-        <p:nvPicPr>
-          <p:cNvPr id="2" name="Audio Recording 12 Jan 2021 at 15:36:38" descr="Audio Recording 12 Jan 2021 at 15:36:38">
-            <a:hlinkClick r:id="" action="ppaction://media"/>
-            <a:extLst>
-              <a:ext uri="{FF2B5EF4-FFF2-40B4-BE49-F238E27FC236}">
-                <a16:creationId xmlns:a16="http://schemas.microsoft.com/office/drawing/2014/main" id="{E0ECEBF6-44E2-9F42-BA74-8AE4BE039155}"/>
-              </a:ext>
-            </a:extLst>
-          </p:cNvPr>
-          <p:cNvPicPr>
-            <a:picLocks noChangeAspect="1"/>
-          </p:cNvPicPr>
-          <p:nvPr>
-            <a:audioFile r:link="rId2"/>
-            <p:extLst>
-              <p:ext uri="{DAA4B4D4-6D71-4841-9C94-3DE7FCFB9230}">
-                <p14:media xmlns:p14="http://schemas.microsoft.com/office/powerpoint/2010/main" r:embed="rId1"/>
-              </p:ext>
-            </p:extLst>
-          </p:nvPr>
-        </p:nvPicPr>
-        <p:blipFill>
-          <a:blip r:embed="rId5"/>
-          <a:stretch>
-            <a:fillRect/>
-          </a:stretch>
-        </p:blipFill>
-        <p:spPr>
-          <a:xfrm>
-            <a:off x="4633913" y="3373438"/>
-            <a:ext cx="812800" cy="812800"/>
-          </a:xfrm>
-          <a:prstGeom prst="rect">
-            <a:avLst/>
-          </a:prstGeom>
-        </p:spPr>
-      </p:pic>
     </p:spTree>
   </p:cSld>
   <p:clrMapOvr>
@@ -9858,90 +9820,6 @@
   <p:transition spd="slow">
     <p:cut/>
   </p:transition>
-  <p:timing>
-    <p:tnLst>
-      <p:par>
-        <p:cTn id="1" dur="indefinite" restart="never" nodeType="tmRoot">
-          <p:childTnLst>
-            <p:seq concurrent="1" nextAc="seek">
-              <p:cTn id="2" dur="indefinite" nodeType="mainSeq">
-                <p:childTnLst>
-                  <p:par>
-                    <p:cTn id="3" fill="hold">
-                      <p:stCondLst>
-                        <p:cond delay="indefinite"/>
-                      </p:stCondLst>
-                      <p:childTnLst>
-                        <p:par>
-                          <p:cTn id="4" fill="hold">
-                            <p:stCondLst>
-                              <p:cond delay="0"/>
-                            </p:stCondLst>
-                            <p:childTnLst>
-                              <p:par>
-                                <p:cTn id="5" presetID="1" presetClass="mediacall" presetSubtype="0" fill="hold" nodeType="clickEffect">
-                                  <p:stCondLst>
-                                    <p:cond delay="0"/>
-                                  </p:stCondLst>
-                                  <p:childTnLst>
-                                    <p:cmd type="call" cmd="playFrom(0.0)">
-                                      <p:cBhvr>
-                                        <p:cTn id="6" dur="92672" fill="hold"/>
-                                        <p:tgtEl>
-                                          <p:spTgt spid="2"/>
-                                        </p:tgtEl>
-                                      </p:cBhvr>
-                                    </p:cmd>
-                                  </p:childTnLst>
-                                </p:cTn>
-                              </p:par>
-                            </p:childTnLst>
-                          </p:cTn>
-                        </p:par>
-                      </p:childTnLst>
-                    </p:cTn>
-                  </p:par>
-                </p:childTnLst>
-              </p:cTn>
-              <p:prevCondLst>
-                <p:cond evt="onPrev" delay="0">
-                  <p:tgtEl>
-                    <p:sldTgt/>
-                  </p:tgtEl>
-                </p:cond>
-              </p:prevCondLst>
-              <p:nextCondLst>
-                <p:cond evt="onNext" delay="0">
-                  <p:tgtEl>
-                    <p:sldTgt/>
-                  </p:tgtEl>
-                </p:cond>
-              </p:nextCondLst>
-            </p:seq>
-            <p:audio>
-              <p:cMediaNode vol="80000">
-                <p:cTn id="7" fill="hold" display="0">
-                  <p:stCondLst>
-                    <p:cond delay="indefinite"/>
-                  </p:stCondLst>
-                  <p:endCondLst>
-                    <p:cond evt="onStopAudio" delay="0">
-                      <p:tgtEl>
-                        <p:sldTgt/>
-                      </p:tgtEl>
-                    </p:cond>
-                  </p:endCondLst>
-                </p:cTn>
-                <p:tgtEl>
-                  <p:spTgt spid="2"/>
-                </p:tgtEl>
-              </p:cMediaNode>
-            </p:audio>
-          </p:childTnLst>
-        </p:cTn>
-      </p:par>
-    </p:tnLst>
-  </p:timing>
 </p:sld>
 </file>
 
@@ -10173,44 +10051,6 @@
           </a:p>
         </p:txBody>
       </p:sp>
-      <p:pic>
-        <p:nvPicPr>
-          <p:cNvPr id="2" name="Audio Recording 12 Jan 2021 at 15:37:08" descr="Audio Recording 12 Jan 2021 at 15:37:08">
-            <a:hlinkClick r:id="" action="ppaction://media"/>
-            <a:extLst>
-              <a:ext uri="{FF2B5EF4-FFF2-40B4-BE49-F238E27FC236}">
-                <a16:creationId xmlns:a16="http://schemas.microsoft.com/office/drawing/2014/main" id="{618D8686-3513-FD42-9BE3-F10226714B92}"/>
-              </a:ext>
-            </a:extLst>
-          </p:cNvPr>
-          <p:cNvPicPr>
-            <a:picLocks noChangeAspect="1"/>
-          </p:cNvPicPr>
-          <p:nvPr>
-            <a:audioFile r:link="rId2"/>
-            <p:extLst>
-              <p:ext uri="{DAA4B4D4-6D71-4841-9C94-3DE7FCFB9230}">
-                <p14:media xmlns:p14="http://schemas.microsoft.com/office/powerpoint/2010/main" r:embed="rId1"/>
-              </p:ext>
-            </p:extLst>
-          </p:nvPr>
-        </p:nvPicPr>
-        <p:blipFill>
-          <a:blip r:embed="rId5"/>
-          <a:stretch>
-            <a:fillRect/>
-          </a:stretch>
-        </p:blipFill>
-        <p:spPr>
-          <a:xfrm>
-            <a:off x="4633913" y="3373438"/>
-            <a:ext cx="812800" cy="812800"/>
-          </a:xfrm>
-          <a:prstGeom prst="rect">
-            <a:avLst/>
-          </a:prstGeom>
-        </p:spPr>
-      </p:pic>
     </p:spTree>
   </p:cSld>
   <p:clrMapOvr>
@@ -10219,90 +10059,6 @@
   <p:transition spd="slow">
     <p:cut/>
   </p:transition>
-  <p:timing>
-    <p:tnLst>
-      <p:par>
-        <p:cTn id="1" dur="indefinite" restart="never" nodeType="tmRoot">
-          <p:childTnLst>
-            <p:seq concurrent="1" nextAc="seek">
-              <p:cTn id="2" dur="indefinite" nodeType="mainSeq">
-                <p:childTnLst>
-                  <p:par>
-                    <p:cTn id="3" fill="hold">
-                      <p:stCondLst>
-                        <p:cond delay="indefinite"/>
-                      </p:stCondLst>
-                      <p:childTnLst>
-                        <p:par>
-                          <p:cTn id="4" fill="hold">
-                            <p:stCondLst>
-                              <p:cond delay="0"/>
-                            </p:stCondLst>
-                            <p:childTnLst>
-                              <p:par>
-                                <p:cTn id="5" presetID="1" presetClass="mediacall" presetSubtype="0" fill="hold" nodeType="clickEffect">
-                                  <p:stCondLst>
-                                    <p:cond delay="0"/>
-                                  </p:stCondLst>
-                                  <p:childTnLst>
-                                    <p:cmd type="call" cmd="playFrom(0.0)">
-                                      <p:cBhvr>
-                                        <p:cTn id="6" dur="21696" fill="hold"/>
-                                        <p:tgtEl>
-                                          <p:spTgt spid="2"/>
-                                        </p:tgtEl>
-                                      </p:cBhvr>
-                                    </p:cmd>
-                                  </p:childTnLst>
-                                </p:cTn>
-                              </p:par>
-                            </p:childTnLst>
-                          </p:cTn>
-                        </p:par>
-                      </p:childTnLst>
-                    </p:cTn>
-                  </p:par>
-                </p:childTnLst>
-              </p:cTn>
-              <p:prevCondLst>
-                <p:cond evt="onPrev" delay="0">
-                  <p:tgtEl>
-                    <p:sldTgt/>
-                  </p:tgtEl>
-                </p:cond>
-              </p:prevCondLst>
-              <p:nextCondLst>
-                <p:cond evt="onNext" delay="0">
-                  <p:tgtEl>
-                    <p:sldTgt/>
-                  </p:tgtEl>
-                </p:cond>
-              </p:nextCondLst>
-            </p:seq>
-            <p:audio>
-              <p:cMediaNode vol="80000">
-                <p:cTn id="7" fill="hold" display="0">
-                  <p:stCondLst>
-                    <p:cond delay="indefinite"/>
-                  </p:stCondLst>
-                  <p:endCondLst>
-                    <p:cond evt="onStopAudio" delay="0">
-                      <p:tgtEl>
-                        <p:sldTgt/>
-                      </p:tgtEl>
-                    </p:cond>
-                  </p:endCondLst>
-                </p:cTn>
-                <p:tgtEl>
-                  <p:spTgt spid="2"/>
-                </p:tgtEl>
-              </p:cMediaNode>
-            </p:audio>
-          </p:childTnLst>
-        </p:cTn>
-      </p:par>
-    </p:tnLst>
-  </p:timing>
 </p:sld>
 </file>
 

</xml_diff>

<commit_message>
End of term slides
</commit_message>
<xml_diff>
--- a/docs/ppt/GEOG0113-008.pptx
+++ b/docs/ppt/GEOG0113-008.pptx
@@ -10912,45 +10912,6 @@
           </a:prstGeom>
         </p:spPr>
       </p:pic>
-      <p:sp>
-        <p:nvSpPr>
-          <p:cNvPr id="388" name="Shape 388"/>
-          <p:cNvSpPr txBox="1">
-            <a:spLocks noGrp="1"/>
-          </p:cNvSpPr>
-          <p:nvPr>
-            <p:ph type="body" idx="1"/>
-          </p:nvPr>
-        </p:nvSpPr>
-        <p:spPr>
-          <a:xfrm>
-            <a:off x="-365466" y="899516"/>
-            <a:ext cx="10734370" cy="5904656"/>
-          </a:xfrm>
-          <a:prstGeom prst="rect">
-            <a:avLst/>
-          </a:prstGeom>
-          <a:noFill/>
-          <a:ln w="9525" cap="flat">
-            <a:solidFill>
-              <a:srgbClr val="000000"/>
-            </a:solidFill>
-            <a:prstDash val="solid"/>
-            <a:round/>
-            <a:headEnd type="none" w="med" len="med"/>
-            <a:tailEnd type="none" w="med" len="med"/>
-          </a:ln>
-        </p:spPr>
-        <p:txBody>
-          <a:bodyPr lIns="91425" tIns="91425" rIns="91425" bIns="91425" anchor="t" anchorCtr="0">
-            <a:noAutofit/>
-          </a:bodyPr>
-          <a:lstStyle/>
-          <a:p>
-            <a:endParaRPr/>
-          </a:p>
-        </p:txBody>
-      </p:sp>
     </p:spTree>
   </p:cSld>
   <p:clrMapOvr>
@@ -11351,44 +11312,6 @@
           </a:p>
         </p:txBody>
       </p:sp>
-      <p:pic>
-        <p:nvPicPr>
-          <p:cNvPr id="2" name="Audio Recording 12 Jan 2021 at 15:30:10" descr="Audio Recording 12 Jan 2021 at 15:30:10">
-            <a:hlinkClick r:id="" action="ppaction://media"/>
-            <a:extLst>
-              <a:ext uri="{FF2B5EF4-FFF2-40B4-BE49-F238E27FC236}">
-                <a16:creationId xmlns:a16="http://schemas.microsoft.com/office/drawing/2014/main" id="{64229B28-D80A-324A-A868-77C8E1CBAD67}"/>
-              </a:ext>
-            </a:extLst>
-          </p:cNvPr>
-          <p:cNvPicPr>
-            <a:picLocks noChangeAspect="1"/>
-          </p:cNvPicPr>
-          <p:nvPr>
-            <a:audioFile r:link="rId2"/>
-            <p:extLst>
-              <p:ext uri="{DAA4B4D4-6D71-4841-9C94-3DE7FCFB9230}">
-                <p14:media xmlns:p14="http://schemas.microsoft.com/office/powerpoint/2010/main" r:embed="rId1"/>
-              </p:ext>
-            </p:extLst>
-          </p:nvPr>
-        </p:nvPicPr>
-        <p:blipFill>
-          <a:blip r:embed="rId5"/>
-          <a:stretch>
-            <a:fillRect/>
-          </a:stretch>
-        </p:blipFill>
-        <p:spPr>
-          <a:xfrm>
-            <a:off x="6117939" y="478383"/>
-            <a:ext cx="812800" cy="812800"/>
-          </a:xfrm>
-          <a:prstGeom prst="rect">
-            <a:avLst/>
-          </a:prstGeom>
-        </p:spPr>
-      </p:pic>
     </p:spTree>
   </p:cSld>
   <p:clrMapOvr>
@@ -11397,90 +11320,6 @@
   <p:transition spd="slow">
     <p:cut/>
   </p:transition>
-  <p:timing>
-    <p:tnLst>
-      <p:par>
-        <p:cTn id="1" dur="indefinite" restart="never" nodeType="tmRoot">
-          <p:childTnLst>
-            <p:seq concurrent="1" nextAc="seek">
-              <p:cTn id="2" dur="indefinite" nodeType="mainSeq">
-                <p:childTnLst>
-                  <p:par>
-                    <p:cTn id="3" fill="hold">
-                      <p:stCondLst>
-                        <p:cond delay="indefinite"/>
-                      </p:stCondLst>
-                      <p:childTnLst>
-                        <p:par>
-                          <p:cTn id="4" fill="hold">
-                            <p:stCondLst>
-                              <p:cond delay="0"/>
-                            </p:stCondLst>
-                            <p:childTnLst>
-                              <p:par>
-                                <p:cTn id="5" presetID="1" presetClass="mediacall" presetSubtype="0" fill="hold" nodeType="clickEffect">
-                                  <p:stCondLst>
-                                    <p:cond delay="0"/>
-                                  </p:stCondLst>
-                                  <p:childTnLst>
-                                    <p:cmd type="call" cmd="playFrom(0.0)">
-                                      <p:cBhvr>
-                                        <p:cTn id="6" dur="57920" fill="hold"/>
-                                        <p:tgtEl>
-                                          <p:spTgt spid="2"/>
-                                        </p:tgtEl>
-                                      </p:cBhvr>
-                                    </p:cmd>
-                                  </p:childTnLst>
-                                </p:cTn>
-                              </p:par>
-                            </p:childTnLst>
-                          </p:cTn>
-                        </p:par>
-                      </p:childTnLst>
-                    </p:cTn>
-                  </p:par>
-                </p:childTnLst>
-              </p:cTn>
-              <p:prevCondLst>
-                <p:cond evt="onPrev" delay="0">
-                  <p:tgtEl>
-                    <p:sldTgt/>
-                  </p:tgtEl>
-                </p:cond>
-              </p:prevCondLst>
-              <p:nextCondLst>
-                <p:cond evt="onNext" delay="0">
-                  <p:tgtEl>
-                    <p:sldTgt/>
-                  </p:tgtEl>
-                </p:cond>
-              </p:nextCondLst>
-            </p:seq>
-            <p:audio>
-              <p:cMediaNode vol="80000">
-                <p:cTn id="7" fill="hold" display="0">
-                  <p:stCondLst>
-                    <p:cond delay="indefinite"/>
-                  </p:stCondLst>
-                  <p:endCondLst>
-                    <p:cond evt="onStopAudio" delay="0">
-                      <p:tgtEl>
-                        <p:sldTgt/>
-                      </p:tgtEl>
-                    </p:cond>
-                  </p:endCondLst>
-                </p:cTn>
-                <p:tgtEl>
-                  <p:spTgt spid="2"/>
-                </p:tgtEl>
-              </p:cMediaNode>
-            </p:audio>
-          </p:childTnLst>
-        </p:cTn>
-      </p:par>
-    </p:tnLst>
-  </p:timing>
 </p:sld>
 </file>
 

</xml_diff>